<commit_message>
Version final del Examen
</commit_message>
<xml_diff>
--- a/Tesis/Presentaciones/FINAL_Examen.pptx
+++ b/Tesis/Presentaciones/FINAL_Examen.pptx
@@ -182,7 +182,7 @@
   </p:defaultTextStyle>
   <p:extLst>
     <p:ext uri="{EFAFB233-063F-42B5-8137-9DF3F51BA10A}">
-      <p15:sldGuideLst xmlns:p15="http://schemas.microsoft.com/office/powerpoint/2012/main" xmlns="">
+      <p15:sldGuideLst xmlns="" xmlns:p15="http://schemas.microsoft.com/office/powerpoint/2012/main">
         <p15:guide id="1" orient="horz" pos="2160">
           <p15:clr>
             <a:srgbClr val="A4A3A4"/>
@@ -330,7 +330,7 @@
           <a:p>
             <a:fld id="{CFA7C8EE-915B-494D-892E-1894E2A93FCC}" type="datetimeFigureOut">
               <a:rPr lang="es-MX" smtClean="0"/>
-              <a:t>12/03/2018</a:t>
+              <a:t>13/03/2018</a:t>
             </a:fld>
             <a:endParaRPr lang="es-MX"/>
           </a:p>
@@ -500,7 +500,7 @@
           <a:p>
             <a:fld id="{CFA7C8EE-915B-494D-892E-1894E2A93FCC}" type="datetimeFigureOut">
               <a:rPr lang="es-MX" smtClean="0"/>
-              <a:t>12/03/2018</a:t>
+              <a:t>13/03/2018</a:t>
             </a:fld>
             <a:endParaRPr lang="es-MX"/>
           </a:p>
@@ -680,7 +680,7 @@
           <a:p>
             <a:fld id="{CFA7C8EE-915B-494D-892E-1894E2A93FCC}" type="datetimeFigureOut">
               <a:rPr lang="es-MX" smtClean="0"/>
-              <a:t>12/03/2018</a:t>
+              <a:t>13/03/2018</a:t>
             </a:fld>
             <a:endParaRPr lang="es-MX"/>
           </a:p>
@@ -850,7 +850,7 @@
           <a:p>
             <a:fld id="{CFA7C8EE-915B-494D-892E-1894E2A93FCC}" type="datetimeFigureOut">
               <a:rPr lang="es-MX" smtClean="0"/>
-              <a:t>12/03/2018</a:t>
+              <a:t>13/03/2018</a:t>
             </a:fld>
             <a:endParaRPr lang="es-MX"/>
           </a:p>
@@ -1096,7 +1096,7 @@
           <a:p>
             <a:fld id="{CFA7C8EE-915B-494D-892E-1894E2A93FCC}" type="datetimeFigureOut">
               <a:rPr lang="es-MX" smtClean="0"/>
-              <a:t>12/03/2018</a:t>
+              <a:t>13/03/2018</a:t>
             </a:fld>
             <a:endParaRPr lang="es-MX"/>
           </a:p>
@@ -1328,7 +1328,7 @@
           <a:p>
             <a:fld id="{CFA7C8EE-915B-494D-892E-1894E2A93FCC}" type="datetimeFigureOut">
               <a:rPr lang="es-MX" smtClean="0"/>
-              <a:t>12/03/2018</a:t>
+              <a:t>13/03/2018</a:t>
             </a:fld>
             <a:endParaRPr lang="es-MX"/>
           </a:p>
@@ -1695,7 +1695,7 @@
           <a:p>
             <a:fld id="{CFA7C8EE-915B-494D-892E-1894E2A93FCC}" type="datetimeFigureOut">
               <a:rPr lang="es-MX" smtClean="0"/>
-              <a:t>12/03/2018</a:t>
+              <a:t>13/03/2018</a:t>
             </a:fld>
             <a:endParaRPr lang="es-MX"/>
           </a:p>
@@ -1813,7 +1813,7 @@
           <a:p>
             <a:fld id="{CFA7C8EE-915B-494D-892E-1894E2A93FCC}" type="datetimeFigureOut">
               <a:rPr lang="es-MX" smtClean="0"/>
-              <a:t>12/03/2018</a:t>
+              <a:t>13/03/2018</a:t>
             </a:fld>
             <a:endParaRPr lang="es-MX"/>
           </a:p>
@@ -1908,7 +1908,7 @@
           <a:p>
             <a:fld id="{CFA7C8EE-915B-494D-892E-1894E2A93FCC}" type="datetimeFigureOut">
               <a:rPr lang="es-MX" smtClean="0"/>
-              <a:t>12/03/2018</a:t>
+              <a:t>13/03/2018</a:t>
             </a:fld>
             <a:endParaRPr lang="es-MX"/>
           </a:p>
@@ -2185,7 +2185,7 @@
           <a:p>
             <a:fld id="{CFA7C8EE-915B-494D-892E-1894E2A93FCC}" type="datetimeFigureOut">
               <a:rPr lang="es-MX" smtClean="0"/>
-              <a:t>12/03/2018</a:t>
+              <a:t>13/03/2018</a:t>
             </a:fld>
             <a:endParaRPr lang="es-MX"/>
           </a:p>
@@ -2438,7 +2438,7 @@
           <a:p>
             <a:fld id="{CFA7C8EE-915B-494D-892E-1894E2A93FCC}" type="datetimeFigureOut">
               <a:rPr lang="es-MX" smtClean="0"/>
-              <a:t>12/03/2018</a:t>
+              <a:t>13/03/2018</a:t>
             </a:fld>
             <a:endParaRPr lang="es-MX"/>
           </a:p>
@@ -2651,7 +2651,7 @@
           <a:p>
             <a:fld id="{CFA7C8EE-915B-494D-892E-1894E2A93FCC}" type="datetimeFigureOut">
               <a:rPr lang="es-MX" smtClean="0"/>
-              <a:t>12/03/2018</a:t>
+              <a:t>13/03/2018</a:t>
             </a:fld>
             <a:endParaRPr lang="es-MX"/>
           </a:p>
@@ -20444,7 +20444,7 @@
   <a:extraClrSchemeLst/>
   <a:extLst>
     <a:ext uri="{05A4C25C-085E-4340-85A3-A5531E510DB2}">
-      <thm15:themeFamily xmlns:thm15="http://schemas.microsoft.com/office/thememl/2012/main" xmlns="" name="Office Theme" id="{62F939B6-93AF-4DB8-9C6B-D6C7DFDC589F}" vid="{4A3C46E8-61CC-4603-A589-7422A47A8E4A}"/>
+      <thm15:themeFamily xmlns="" xmlns:thm15="http://schemas.microsoft.com/office/thememl/2012/main" name="Office Theme" id="{62F939B6-93AF-4DB8-9C6B-D6C7DFDC589F}" vid="{4A3C46E8-61CC-4603-A589-7422A47A8E4A}"/>
     </a:ext>
   </a:extLst>
 </a:theme>

</xml_diff>